<commit_message>
Updated links and tasks
</commit_message>
<xml_diff>
--- a/PathogenDataCourse/SlideSets/Statistics.pptx
+++ b/PathogenDataCourse/SlideSets/Statistics.pptx
@@ -3698,7 +3698,7 @@
           <a:p>
             <a:fld id="{C4181D7C-81F1-BA48-B0CF-02C398C91972}" type="datetimeFigureOut">
               <a:rPr lang="en-US" smtClean="0"/>
-              <a:t>7/4/23</a:t>
+              <a:t>7/5/23</a:t>
             </a:fld>
             <a:endParaRPr lang="en-US"/>
           </a:p>
@@ -8264,7 +8264,7 @@
             <a:fld id="{197342E9-89D0-D246-B0E5-635614E13D75}" type="datetime1">
               <a:rPr lang="en-GB" smtClean="0"/>
               <a:pPr/>
-              <a:t>04/07/2023</a:t>
+              <a:t>05/07/2023</a:t>
             </a:fld>
             <a:endParaRPr lang="en-US" dirty="0"/>
           </a:p>
@@ -12882,7 +12882,7 @@
             <a:fld id="{197342E9-89D0-D246-B0E5-635614E13D75}" type="datetime1">
               <a:rPr lang="en-GB" smtClean="0"/>
               <a:pPr/>
-              <a:t>04/07/2023</a:t>
+              <a:t>05/07/2023</a:t>
             </a:fld>
             <a:endParaRPr lang="en-US" dirty="0"/>
           </a:p>
@@ -15965,7 +15965,7 @@
             <a:fld id="{197342E9-89D0-D246-B0E5-635614E13D75}" type="datetime1">
               <a:rPr lang="en-GB" smtClean="0"/>
               <a:pPr/>
-              <a:t>04/07/2023</a:t>
+              <a:t>05/07/2023</a:t>
             </a:fld>
             <a:endParaRPr lang="en-US" dirty="0"/>
           </a:p>
@@ -27109,7 +27109,7 @@
             </a:pPr>
             <a:r>
               <a:rPr lang="en-CA" sz="1600" dirty="0"/>
-              <a:t>Do 3 different drugs each have the same or different effects on insulin levels in mice?</a:t>
+              <a:t>Do 3 different drugs each have the same or different effects on insulin levels in mice (different mice tested for each drug)?</a:t>
             </a:r>
           </a:p>
         </p:txBody>
@@ -30041,58 +30041,6 @@
           </a:p>
         </p:txBody>
       </p:sp>
-      <p:sp>
-        <p:nvSpPr>
-          <p:cNvPr id="5" name="TextBox 4">
-            <a:extLst>
-              <a:ext uri="{FF2B5EF4-FFF2-40B4-BE49-F238E27FC236}">
-                <a16:creationId xmlns:a16="http://schemas.microsoft.com/office/drawing/2014/main" id="{8C5DA9D7-8DE4-90D0-6E2A-06660ED7B094}"/>
-              </a:ext>
-            </a:extLst>
-          </p:cNvPr>
-          <p:cNvSpPr txBox="1"/>
-          <p:nvPr/>
-        </p:nvSpPr>
-        <p:spPr>
-          <a:xfrm>
-            <a:off x="3441266" y="1222626"/>
-            <a:ext cx="5347939" cy="369332"/>
-          </a:xfrm>
-          <a:prstGeom prst="rect">
-            <a:avLst/>
-          </a:prstGeom>
-          <a:noFill/>
-        </p:spPr>
-        <p:txBody>
-          <a:bodyPr wrap="none" rtlCol="0">
-            <a:spAutoFit/>
-          </a:bodyPr>
-          <a:lstStyle/>
-          <a:p>
-            <a:r>
-              <a:rPr lang="en-GB" dirty="0">
-                <a:latin typeface="Lucida Sans Unicode" panose="020B0602030504020204" pitchFamily="34" charset="0"/>
-                <a:cs typeface="Lucida Sans Unicode" panose="020B0602030504020204" pitchFamily="34" charset="0"/>
-              </a:rPr>
-              <a:t>Open </a:t>
-            </a:r>
-            <a:r>
-              <a:rPr lang="en-GB" dirty="0" err="1">
-                <a:latin typeface="Lucida Sans Unicode" panose="020B0602030504020204" pitchFamily="34" charset="0"/>
-                <a:cs typeface="Lucida Sans Unicode" panose="020B0602030504020204" pitchFamily="34" charset="0"/>
-              </a:rPr>
-              <a:t>menti.com</a:t>
-            </a:r>
-            <a:r>
-              <a:rPr lang="en-GB" dirty="0">
-                <a:latin typeface="Lucida Sans Unicode" panose="020B0602030504020204" pitchFamily="34" charset="0"/>
-                <a:cs typeface="Lucida Sans Unicode" panose="020B0602030504020204" pitchFamily="34" charset="0"/>
-              </a:rPr>
-              <a:t> and use the code 4062 3440</a:t>
-            </a:r>
-          </a:p>
-        </p:txBody>
-      </p:sp>
     </p:spTree>
     <p:extLst>
       <p:ext uri="{BB962C8B-B14F-4D97-AF65-F5344CB8AC3E}">
@@ -30292,58 +30240,6 @@
           </a:p>
           <a:p>
             <a:endParaRPr lang="en-CA" sz="2400" dirty="0"/>
-          </a:p>
-        </p:txBody>
-      </p:sp>
-      <p:sp>
-        <p:nvSpPr>
-          <p:cNvPr id="5" name="TextBox 4">
-            <a:extLst>
-              <a:ext uri="{FF2B5EF4-FFF2-40B4-BE49-F238E27FC236}">
-                <a16:creationId xmlns:a16="http://schemas.microsoft.com/office/drawing/2014/main" id="{8C5DA9D7-8DE4-90D0-6E2A-06660ED7B094}"/>
-              </a:ext>
-            </a:extLst>
-          </p:cNvPr>
-          <p:cNvSpPr txBox="1"/>
-          <p:nvPr/>
-        </p:nvSpPr>
-        <p:spPr>
-          <a:xfrm>
-            <a:off x="3441266" y="1222626"/>
-            <a:ext cx="5309467" cy="369332"/>
-          </a:xfrm>
-          <a:prstGeom prst="rect">
-            <a:avLst/>
-          </a:prstGeom>
-          <a:noFill/>
-        </p:spPr>
-        <p:txBody>
-          <a:bodyPr wrap="none" rtlCol="0">
-            <a:spAutoFit/>
-          </a:bodyPr>
-          <a:lstStyle/>
-          <a:p>
-            <a:r>
-              <a:rPr lang="en-GB" dirty="0">
-                <a:latin typeface="Lucida Sans Unicode" panose="020B0602030504020204" pitchFamily="34" charset="0"/>
-                <a:cs typeface="Lucida Sans Unicode" panose="020B0602030504020204" pitchFamily="34" charset="0"/>
-              </a:rPr>
-              <a:t>Open </a:t>
-            </a:r>
-            <a:r>
-              <a:rPr lang="en-GB" dirty="0" err="1">
-                <a:latin typeface="Lucida Sans Unicode" panose="020B0602030504020204" pitchFamily="34" charset="0"/>
-                <a:cs typeface="Lucida Sans Unicode" panose="020B0602030504020204" pitchFamily="34" charset="0"/>
-              </a:rPr>
-              <a:t>menti.com</a:t>
-            </a:r>
-            <a:r>
-              <a:rPr lang="en-GB" dirty="0">
-                <a:latin typeface="Lucida Sans Unicode" panose="020B0602030504020204" pitchFamily="34" charset="0"/>
-                <a:cs typeface="Lucida Sans Unicode" panose="020B0602030504020204" pitchFamily="34" charset="0"/>
-              </a:rPr>
-              <a:t> and use the code 4062 3440</a:t>
-            </a:r>
           </a:p>
         </p:txBody>
       </p:sp>
@@ -31190,21 +31086,6 @@
 </file>
 
 <file path=customXml/item1.xml><?xml version="1.0" encoding="utf-8"?>
-<p:properties xmlns:p="http://schemas.microsoft.com/office/2006/metadata/properties" xmlns:xsi="http://www.w3.org/2001/XMLSchema-instance" xmlns:pc="http://schemas.microsoft.com/office/infopath/2007/PartnerControls">
-  <documentManagement/>
-</p:properties>
-</file>
-
-<file path=customXml/item2.xml><?xml version="1.0" encoding="utf-8"?>
-<?mso-contentType ?>
-<FormTemplates xmlns="http://schemas.microsoft.com/sharepoint/v3/contenttype/forms">
-  <Display>DocumentLibraryForm</Display>
-  <Edit>DocumentLibraryForm</Edit>
-  <New>DocumentLibraryForm</New>
-</FormTemplates>
-</file>
-
-<file path=customXml/item3.xml><?xml version="1.0" encoding="utf-8"?>
 <ct:contentTypeSchema xmlns:ct="http://schemas.microsoft.com/office/2006/metadata/contentType" xmlns:ma="http://schemas.microsoft.com/office/2006/metadata/properties/metaAttributes" ct:_="" ma:_="" ma:contentTypeName="Document" ma:contentTypeID="0x010100E248A64365211844BF30BC3ADD420261" ma:contentTypeVersion="11" ma:contentTypeDescription="Create a new document." ma:contentTypeScope="" ma:versionID="bf0b94b058452ed3cec91f89e664909d">
   <xsd:schema xmlns:xsd="http://www.w3.org/2001/XMLSchema" xmlns:xs="http://www.w3.org/2001/XMLSchema" xmlns:p="http://schemas.microsoft.com/office/2006/metadata/properties" xmlns:ns2="8dbe2aa3-3237-4830-85c4-3d48417ef302" xmlns:ns3="b317b901-4ab4-4161-80c3-da5df50c25bf" targetNamespace="http://schemas.microsoft.com/office/2006/metadata/properties" ma:root="true" ma:fieldsID="d988d784501c0b668dd73c0ebdbd98a4" ns2:_="" ns3:_="">
     <xsd:import namespace="8dbe2aa3-3237-4830-85c4-3d48417ef302"/>
@@ -31415,7 +31296,41 @@
 </ct:contentTypeSchema>
 </file>
 
+<file path=customXml/item2.xml><?xml version="1.0" encoding="utf-8"?>
+<p:properties xmlns:p="http://schemas.microsoft.com/office/2006/metadata/properties" xmlns:xsi="http://www.w3.org/2001/XMLSchema-instance" xmlns:pc="http://schemas.microsoft.com/office/infopath/2007/PartnerControls">
+  <documentManagement/>
+</p:properties>
+</file>
+
+<file path=customXml/item3.xml><?xml version="1.0" encoding="utf-8"?>
+<?mso-contentType ?>
+<FormTemplates xmlns="http://schemas.microsoft.com/sharepoint/v3/contenttype/forms">
+  <Display>DocumentLibraryForm</Display>
+  <Edit>DocumentLibraryForm</Edit>
+  <New>DocumentLibraryForm</New>
+</FormTemplates>
+</file>
+
 <file path=customXml/itemProps1.xml><?xml version="1.0" encoding="utf-8"?>
+<ds:datastoreItem xmlns:ds="http://schemas.openxmlformats.org/officeDocument/2006/customXml" ds:itemID="{72E4F038-6994-4608-A1EA-AF583DA06B5C}">
+  <ds:schemaRefs>
+    <ds:schemaRef ds:uri="http://schemas.microsoft.com/office/2006/metadata/contentType"/>
+    <ds:schemaRef ds:uri="http://schemas.microsoft.com/office/2006/metadata/properties/metaAttributes"/>
+    <ds:schemaRef ds:uri="http://www.w3.org/2001/XMLSchema"/>
+    <ds:schemaRef ds:uri="http://schemas.microsoft.com/office/2006/metadata/properties"/>
+    <ds:schemaRef ds:uri="8dbe2aa3-3237-4830-85c4-3d48417ef302"/>
+    <ds:schemaRef ds:uri="b317b901-4ab4-4161-80c3-da5df50c25bf"/>
+    <ds:schemaRef ds:uri="http://schemas.microsoft.com/office/2006/documentManagement/types"/>
+    <ds:schemaRef ds:uri="http://schemas.microsoft.com/office/infopath/2007/PartnerControls"/>
+    <ds:schemaRef ds:uri="http://schemas.openxmlformats.org/package/2006/metadata/core-properties"/>
+    <ds:schemaRef ds:uri="http://purl.org/dc/elements/1.1/"/>
+    <ds:schemaRef ds:uri="http://purl.org/dc/terms/"/>
+    <ds:schemaRef ds:uri="http://schemas.microsoft.com/internal/obd"/>
+  </ds:schemaRefs>
+</ds:datastoreItem>
+</file>
+
+<file path=customXml/itemProps2.xml><?xml version="1.0" encoding="utf-8"?>
 <ds:datastoreItem xmlns:ds="http://schemas.openxmlformats.org/officeDocument/2006/customXml" ds:itemID="{71F1859A-D475-4A9D-83E1-80A36DBA260F}">
   <ds:schemaRefs>
     <ds:schemaRef ds:uri="http://schemas.microsoft.com/office/2006/metadata/properties"/>
@@ -31432,29 +31347,10 @@
 </ds:datastoreItem>
 </file>
 
-<file path=customXml/itemProps2.xml><?xml version="1.0" encoding="utf-8"?>
+<file path=customXml/itemProps3.xml><?xml version="1.0" encoding="utf-8"?>
 <ds:datastoreItem xmlns:ds="http://schemas.openxmlformats.org/officeDocument/2006/customXml" ds:itemID="{B1063616-57F3-4C87-BB7F-2974CF36DE76}">
   <ds:schemaRefs>
     <ds:schemaRef ds:uri="http://schemas.microsoft.com/sharepoint/v3/contenttype/forms"/>
   </ds:schemaRefs>
 </ds:datastoreItem>
-</file>
-
-<file path=customXml/itemProps3.xml><?xml version="1.0" encoding="utf-8"?>
-<ds:datastoreItem xmlns:ds="http://schemas.openxmlformats.org/officeDocument/2006/customXml" ds:itemID="{72E4F038-6994-4608-A1EA-AF583DA06B5C}">
-  <ds:schemaRefs>
-    <ds:schemaRef ds:uri="http://schemas.microsoft.com/office/2006/metadata/contentType"/>
-    <ds:schemaRef ds:uri="http://schemas.microsoft.com/office/2006/metadata/properties/metaAttributes"/>
-    <ds:schemaRef ds:uri="http://www.w3.org/2001/XMLSchema"/>
-    <ds:schemaRef ds:uri="http://schemas.microsoft.com/office/2006/metadata/properties"/>
-    <ds:schemaRef ds:uri="8dbe2aa3-3237-4830-85c4-3d48417ef302"/>
-    <ds:schemaRef ds:uri="b317b901-4ab4-4161-80c3-da5df50c25bf"/>
-    <ds:schemaRef ds:uri="http://schemas.microsoft.com/office/2006/documentManagement/types"/>
-    <ds:schemaRef ds:uri="http://schemas.microsoft.com/office/infopath/2007/PartnerControls"/>
-    <ds:schemaRef ds:uri="http://schemas.openxmlformats.org/package/2006/metadata/core-properties"/>
-    <ds:schemaRef ds:uri="http://purl.org/dc/elements/1.1/"/>
-    <ds:schemaRef ds:uri="http://purl.org/dc/terms/"/>
-    <ds:schemaRef ds:uri="http://schemas.microsoft.com/internal/obd"/>
-  </ds:schemaRefs>
-</ds:datastoreItem>
 </file>
</xml_diff>